<commit_message>
update: Potential project topic PPT - delete unrelevant project topics
</commit_message>
<xml_diff>
--- a/Potential_Project_LLM.pptx
+++ b/Potential_Project_LLM.pptx
@@ -5,12 +5,8 @@
     <p:sldMasterId id="2147483648" r:id="rId1"/>
   </p:sldMasterIdLst>
   <p:sldIdLst>
-    <p:sldId id="256" r:id="rId2"/>
-    <p:sldId id="257" r:id="rId3"/>
-    <p:sldId id="258" r:id="rId4"/>
-    <p:sldId id="259" r:id="rId5"/>
-    <p:sldId id="260" r:id="rId6"/>
-    <p:sldId id="261" r:id="rId7"/>
+    <p:sldId id="260" r:id="rId2"/>
+    <p:sldId id="261" r:id="rId3"/>
   </p:sldIdLst>
   <p:sldSz cx="12192000" cy="6858000"/>
   <p:notesSz cx="6858000" cy="9144000"/>
@@ -109,6 +105,11 @@
       </a:defRPr>
     </a:lvl9pPr>
   </p:defaultTextStyle>
+  <p:extLst>
+    <p:ext uri="{EFAFB233-063F-42B5-8137-9DF3F51BA10A}">
+      <p15:sldGuideLst xmlns:p15="http://schemas.microsoft.com/office/powerpoint/2012/main"/>
+    </p:ext>
+  </p:extLst>
 </p:presentation>
 </file>
 
@@ -261,7 +262,7 @@
           <a:p>
             <a:fld id="{689F0073-57E5-474A-8DD3-7A6073418981}" type="datetimeFigureOut">
               <a:rPr lang="zh-Hans-HK" altLang="en-US" smtClean="0"/>
-              <a:t>12/9/2025</a:t>
+              <a:t>15/9/2025</a:t>
             </a:fld>
             <a:endParaRPr lang="zh-Hans-HK" altLang="en-US"/>
           </a:p>
@@ -461,7 +462,7 @@
           <a:p>
             <a:fld id="{689F0073-57E5-474A-8DD3-7A6073418981}" type="datetimeFigureOut">
               <a:rPr lang="zh-Hans-HK" altLang="en-US" smtClean="0"/>
-              <a:t>12/9/2025</a:t>
+              <a:t>15/9/2025</a:t>
             </a:fld>
             <a:endParaRPr lang="zh-Hans-HK" altLang="en-US"/>
           </a:p>
@@ -671,7 +672,7 @@
           <a:p>
             <a:fld id="{689F0073-57E5-474A-8DD3-7A6073418981}" type="datetimeFigureOut">
               <a:rPr lang="zh-Hans-HK" altLang="en-US" smtClean="0"/>
-              <a:t>12/9/2025</a:t>
+              <a:t>15/9/2025</a:t>
             </a:fld>
             <a:endParaRPr lang="zh-Hans-HK" altLang="en-US"/>
           </a:p>
@@ -871,7 +872,7 @@
           <a:p>
             <a:fld id="{689F0073-57E5-474A-8DD3-7A6073418981}" type="datetimeFigureOut">
               <a:rPr lang="zh-Hans-HK" altLang="en-US" smtClean="0"/>
-              <a:t>12/9/2025</a:t>
+              <a:t>15/9/2025</a:t>
             </a:fld>
             <a:endParaRPr lang="zh-Hans-HK" altLang="en-US"/>
           </a:p>
@@ -1147,7 +1148,7 @@
           <a:p>
             <a:fld id="{689F0073-57E5-474A-8DD3-7A6073418981}" type="datetimeFigureOut">
               <a:rPr lang="zh-Hans-HK" altLang="en-US" smtClean="0"/>
-              <a:t>12/9/2025</a:t>
+              <a:t>15/9/2025</a:t>
             </a:fld>
             <a:endParaRPr lang="zh-Hans-HK" altLang="en-US"/>
           </a:p>
@@ -1415,7 +1416,7 @@
           <a:p>
             <a:fld id="{689F0073-57E5-474A-8DD3-7A6073418981}" type="datetimeFigureOut">
               <a:rPr lang="zh-Hans-HK" altLang="en-US" smtClean="0"/>
-              <a:t>12/9/2025</a:t>
+              <a:t>15/9/2025</a:t>
             </a:fld>
             <a:endParaRPr lang="zh-Hans-HK" altLang="en-US"/>
           </a:p>
@@ -1830,7 +1831,7 @@
           <a:p>
             <a:fld id="{689F0073-57E5-474A-8DD3-7A6073418981}" type="datetimeFigureOut">
               <a:rPr lang="zh-Hans-HK" altLang="en-US" smtClean="0"/>
-              <a:t>12/9/2025</a:t>
+              <a:t>15/9/2025</a:t>
             </a:fld>
             <a:endParaRPr lang="zh-Hans-HK" altLang="en-US"/>
           </a:p>
@@ -1972,7 +1973,7 @@
           <a:p>
             <a:fld id="{689F0073-57E5-474A-8DD3-7A6073418981}" type="datetimeFigureOut">
               <a:rPr lang="zh-Hans-HK" altLang="en-US" smtClean="0"/>
-              <a:t>12/9/2025</a:t>
+              <a:t>15/9/2025</a:t>
             </a:fld>
             <a:endParaRPr lang="zh-Hans-HK" altLang="en-US"/>
           </a:p>
@@ -2085,7 +2086,7 @@
           <a:p>
             <a:fld id="{689F0073-57E5-474A-8DD3-7A6073418981}" type="datetimeFigureOut">
               <a:rPr lang="zh-Hans-HK" altLang="en-US" smtClean="0"/>
-              <a:t>12/9/2025</a:t>
+              <a:t>15/9/2025</a:t>
             </a:fld>
             <a:endParaRPr lang="zh-Hans-HK" altLang="en-US"/>
           </a:p>
@@ -2398,7 +2399,7 @@
           <a:p>
             <a:fld id="{689F0073-57E5-474A-8DD3-7A6073418981}" type="datetimeFigureOut">
               <a:rPr lang="zh-Hans-HK" altLang="en-US" smtClean="0"/>
-              <a:t>12/9/2025</a:t>
+              <a:t>15/9/2025</a:t>
             </a:fld>
             <a:endParaRPr lang="zh-Hans-HK" altLang="en-US"/>
           </a:p>
@@ -2687,7 +2688,7 @@
           <a:p>
             <a:fld id="{689F0073-57E5-474A-8DD3-7A6073418981}" type="datetimeFigureOut">
               <a:rPr lang="zh-Hans-HK" altLang="en-US" smtClean="0"/>
-              <a:t>12/9/2025</a:t>
+              <a:t>15/9/2025</a:t>
             </a:fld>
             <a:endParaRPr lang="zh-Hans-HK" altLang="en-US"/>
           </a:p>
@@ -2930,7 +2931,7 @@
           <a:p>
             <a:fld id="{689F0073-57E5-474A-8DD3-7A6073418981}" type="datetimeFigureOut">
               <a:rPr lang="zh-Hans-HK" altLang="en-US" smtClean="0"/>
-              <a:t>12/9/2025</a:t>
+              <a:t>15/9/2025</a:t>
             </a:fld>
             <a:endParaRPr lang="zh-Hans-HK" altLang="en-US"/>
           </a:p>
@@ -3349,10 +3350,10 @@
       </p:grpSpPr>
       <p:sp>
         <p:nvSpPr>
-          <p:cNvPr id="4" name="標題 3">
-            <a:extLst>
-              <a:ext uri="{FF2B5EF4-FFF2-40B4-BE49-F238E27FC236}">
-                <a16:creationId xmlns:a16="http://schemas.microsoft.com/office/drawing/2014/main" id="{8DE47F09-2756-82AA-E9B8-CEADC8D1A889}"/>
+          <p:cNvPr id="2" name="標題 1">
+            <a:extLst>
+              <a:ext uri="{FF2B5EF4-FFF2-40B4-BE49-F238E27FC236}">
+                <a16:creationId xmlns:a16="http://schemas.microsoft.com/office/drawing/2014/main" id="{DEFF590C-2D6A-BA83-FF88-D9C516866F91}"/>
               </a:ext>
             </a:extLst>
           </p:cNvPr>
@@ -3369,8 +3370,8 @@
           <a:lstStyle/>
           <a:p>
             <a:r>
-              <a:rPr lang="it-IT" altLang="zh-Hans-HK" dirty="0"/>
-              <a:t>1. Code Documentation Auto-Generator with Multi-Language Support</a:t>
+              <a:rPr lang="en-US" altLang="zh-Hans-HK" dirty="0"/>
+              <a:t>Hallucination Detection &amp; Mitigation for LLMs</a:t>
             </a:r>
             <a:endParaRPr lang="zh-Hans-HK" altLang="en-US" dirty="0"/>
           </a:p>
@@ -3378,10 +3379,10 @@
       </p:sp>
       <p:sp>
         <p:nvSpPr>
-          <p:cNvPr id="5" name="內容版面配置區 4">
-            <a:extLst>
-              <a:ext uri="{FF2B5EF4-FFF2-40B4-BE49-F238E27FC236}">
-                <a16:creationId xmlns:a16="http://schemas.microsoft.com/office/drawing/2014/main" id="{3401ABD7-943C-B208-EAC7-F85D10CAFF75}"/>
+          <p:cNvPr id="3" name="內容版面配置區 2">
+            <a:extLst>
+              <a:ext uri="{FF2B5EF4-FFF2-40B4-BE49-F238E27FC236}">
+                <a16:creationId xmlns:a16="http://schemas.microsoft.com/office/drawing/2014/main" id="{C8C11CAD-F862-D8EC-F1C1-A565BC084BD2}"/>
               </a:ext>
             </a:extLst>
           </p:cNvPr>
@@ -3399,35 +3400,51 @@
           <a:p>
             <a:r>
               <a:rPr lang="en-US" altLang="zh-Hans-HK" dirty="0"/>
-              <a:t>Brief Introduction: Develop an LLM-based system that automatically generates comprehensive documentation (READMEs, API docs, inline comments) for code repositories by analyzing code structure and logic.</a:t>
-            </a:r>
-          </a:p>
-          <a:p>
+              <a:t>Brief Introduction: Detect factual hallucinations in LLM outputs </a:t>
+            </a:r>
+            <a:r>
+              <a:rPr lang="en-US" altLang="zh-Hans-HK"/>
+              <a:t>and reduce </a:t>
+            </a:r>
             <a:r>
               <a:rPr lang="en-US" altLang="zh-Hans-HK" dirty="0"/>
-              <a:t>Technical Innovation: Fine-tune smaller LLMs (e.g., </a:t>
+              <a:t>them using a lightweight, plug-and-play verifier module without needing a huge "judge" model.</a:t>
+            </a:r>
+          </a:p>
+          <a:p>
+            <a:r>
+              <a:rPr lang="en-US" altLang="zh-Hans-HK" dirty="0"/>
+              <a:t>Technical Innovation:  A lightweight verifier ensemble combining retrieval evidence scoring, contradiction detection (NLI), and model uncertainty signals (e.g., self-consistency, entropy).</a:t>
+            </a:r>
+          </a:p>
+          <a:p>
+            <a:r>
+              <a:rPr lang="en-US" altLang="zh-Hans-HK" dirty="0"/>
+              <a:t>Technical Stack: Python, Transformers, PEFT (</a:t>
             </a:r>
             <a:r>
               <a:rPr lang="en-US" altLang="zh-Hans-HK" dirty="0" err="1"/>
-              <a:t>CodeLlama</a:t>
+              <a:t>LoRA</a:t>
             </a:r>
             <a:r>
               <a:rPr lang="en-US" altLang="zh-Hans-HK" dirty="0"/>
-              <a:t>) on code-documentation pairs; combine Abstract Syntax Tree (AST) analysis with LLM generation; support customizable documentation styles.</a:t>
-            </a:r>
-          </a:p>
-          <a:p>
+              <a:t>/</a:t>
+            </a:r>
+            <a:r>
+              <a:rPr lang="en-US" altLang="zh-Hans-HK" dirty="0" err="1"/>
+              <a:t>QLoRA</a:t>
+            </a:r>
             <a:r>
               <a:rPr lang="en-US" altLang="zh-Hans-HK" dirty="0"/>
-              <a:t>Technical Stack: Python, Transformers, Tree-sitter, </a:t>
+              <a:t>), Vector DBs (FAISS/Chroma), NLI models (e.g., </a:t>
             </a:r>
             <a:r>
               <a:rPr lang="en-US" altLang="zh-Hans-HK" dirty="0" err="1"/>
-              <a:t>FastAPI</a:t>
+              <a:t>DeBERTa</a:t>
             </a:r>
             <a:r>
               <a:rPr lang="en-US" altLang="zh-Hans-HK" dirty="0"/>
-              <a:t>, React.</a:t>
+              <a:t>).</a:t>
             </a:r>
             <a:endParaRPr lang="zh-Hans-HK" altLang="en-US" dirty="0"/>
           </a:p>
@@ -3436,7 +3453,7 @@
     </p:spTree>
     <p:extLst>
       <p:ext uri="{BB962C8B-B14F-4D97-AF65-F5344CB8AC3E}">
-        <p14:creationId xmlns:p14="http://schemas.microsoft.com/office/powerpoint/2010/main" val="3329774393"/>
+        <p14:creationId xmlns:p14="http://schemas.microsoft.com/office/powerpoint/2010/main" val="3016173225"/>
       </p:ext>
     </p:extLst>
   </p:cSld>
@@ -3468,7 +3485,7 @@
           <p:cNvPr id="2" name="標題 1">
             <a:extLst>
               <a:ext uri="{FF2B5EF4-FFF2-40B4-BE49-F238E27FC236}">
-                <a16:creationId xmlns:a16="http://schemas.microsoft.com/office/drawing/2014/main" id="{755F972C-7ECD-7A17-84CD-0E1078D28BC0}"/>
+                <a16:creationId xmlns:a16="http://schemas.microsoft.com/office/drawing/2014/main" id="{118CE7EA-A20D-5808-ADD5-103408FA9BEB}"/>
               </a:ext>
             </a:extLst>
           </p:cNvPr>
@@ -3486,7 +3503,7 @@
           <a:p>
             <a:r>
               <a:rPr lang="en-US" altLang="zh-Hans-HK" dirty="0"/>
-              <a:t>2. Multi-Modal Recipe Generator with Dietary Constraints</a:t>
+              <a:t>Planned Roadmap</a:t>
             </a:r>
             <a:endParaRPr lang="zh-Hans-HK" altLang="en-US" dirty="0"/>
           </a:p>
@@ -3497,7 +3514,7 @@
           <p:cNvPr id="3" name="內容版面配置區 2">
             <a:extLst>
               <a:ext uri="{FF2B5EF4-FFF2-40B4-BE49-F238E27FC236}">
-                <a16:creationId xmlns:a16="http://schemas.microsoft.com/office/drawing/2014/main" id="{99C963F5-5F45-1F68-C9D6-FEB069415257}"/>
+                <a16:creationId xmlns:a16="http://schemas.microsoft.com/office/drawing/2014/main" id="{0C0061CC-F92F-4A7C-C055-323C8E38154C}"/>
               </a:ext>
             </a:extLst>
           </p:cNvPr>
@@ -3510,504 +3527,8 @@
         </p:nvSpPr>
         <p:spPr/>
         <p:txBody>
-          <a:bodyPr/>
-          <a:lstStyle/>
-          <a:p>
-            <a:r>
-              <a:rPr lang="en-US" altLang="zh-Hans-HK" dirty="0"/>
-              <a:t>Brief Introduction:</a:t>
-            </a:r>
-            <a:r>
-              <a:rPr lang="zh-CN" altLang="en-US" dirty="0"/>
-              <a:t> </a:t>
-            </a:r>
-            <a:r>
-              <a:rPr lang="en-US" altLang="zh-CN" dirty="0"/>
-              <a:t>Develop a creative cooking assistant that generates recipes based on available ingredients (text or images), dietary restrictions, and nutritional goals.</a:t>
-            </a:r>
-          </a:p>
-          <a:p>
-            <a:r>
-              <a:rPr lang="en-US" altLang="zh-Hans-HK" dirty="0"/>
-              <a:t>Technical Innovation: Multi-modal input processing (text + images); nutritional calculation and optimization; cultural cuisine style transfer.</a:t>
-            </a:r>
-          </a:p>
-          <a:p>
-            <a:r>
-              <a:rPr lang="en-US" altLang="zh-Hans-HK" dirty="0"/>
-              <a:t>Technical Stack: Python, Transformers, Computer Vision models (e.g., CLIP, </a:t>
-            </a:r>
-            <a:r>
-              <a:rPr lang="en-US" altLang="zh-Hans-HK" dirty="0" err="1"/>
-              <a:t>ViT</a:t>
-            </a:r>
-            <a:r>
-              <a:rPr lang="en-US" altLang="zh-Hans-HK" dirty="0"/>
-              <a:t>), Nutritional APIs, </a:t>
-            </a:r>
-            <a:r>
-              <a:rPr lang="en-US" altLang="zh-Hans-HK" dirty="0" err="1"/>
-              <a:t>Streamlit</a:t>
-            </a:r>
-            <a:r>
-              <a:rPr lang="en-US" altLang="zh-Hans-HK" dirty="0"/>
-              <a:t>.</a:t>
-            </a:r>
-            <a:endParaRPr lang="zh-Hans-HK" altLang="en-US" dirty="0"/>
-          </a:p>
-        </p:txBody>
-      </p:sp>
-    </p:spTree>
-    <p:extLst>
-      <p:ext uri="{BB962C8B-B14F-4D97-AF65-F5344CB8AC3E}">
-        <p14:creationId xmlns:p14="http://schemas.microsoft.com/office/powerpoint/2010/main" val="3534783427"/>
-      </p:ext>
-    </p:extLst>
-  </p:cSld>
-  <p:clrMapOvr>
-    <a:masterClrMapping/>
-  </p:clrMapOvr>
-</p:sld>
-</file>
-
-<file path=ppt/slides/slide3.xml><?xml version="1.0" encoding="utf-8"?>
-<p:sld xmlns:a="http://schemas.openxmlformats.org/drawingml/2006/main" xmlns:r="http://schemas.openxmlformats.org/officeDocument/2006/relationships" xmlns:p="http://schemas.openxmlformats.org/presentationml/2006/main">
-  <p:cSld>
-    <p:spTree>
-      <p:nvGrpSpPr>
-        <p:cNvPr id="1" name=""/>
-        <p:cNvGrpSpPr/>
-        <p:nvPr/>
-      </p:nvGrpSpPr>
-      <p:grpSpPr>
-        <a:xfrm>
-          <a:off x="0" y="0"/>
-          <a:ext cx="0" cy="0"/>
-          <a:chOff x="0" y="0"/>
-          <a:chExt cx="0" cy="0"/>
-        </a:xfrm>
-      </p:grpSpPr>
-      <p:sp>
-        <p:nvSpPr>
-          <p:cNvPr id="2" name="標題 1">
-            <a:extLst>
-              <a:ext uri="{FF2B5EF4-FFF2-40B4-BE49-F238E27FC236}">
-                <a16:creationId xmlns:a16="http://schemas.microsoft.com/office/drawing/2014/main" id="{3FA35BF8-5C1F-E1D9-5828-80813C7C52AA}"/>
-              </a:ext>
-            </a:extLst>
-          </p:cNvPr>
-          <p:cNvSpPr>
-            <a:spLocks noGrp="1"/>
-          </p:cNvSpPr>
-          <p:nvPr>
-            <p:ph type="title"/>
-          </p:nvPr>
-        </p:nvSpPr>
-        <p:spPr/>
-        <p:txBody>
-          <a:bodyPr/>
-          <a:lstStyle/>
-          <a:p>
-            <a:r>
-              <a:rPr lang="en-US" altLang="zh-Hans-HK" dirty="0"/>
-              <a:t>3. Conversational SQL Query Builder for Non-Technical Users</a:t>
-            </a:r>
-            <a:endParaRPr lang="zh-Hans-HK" altLang="en-US" dirty="0"/>
-          </a:p>
-        </p:txBody>
-      </p:sp>
-      <p:sp>
-        <p:nvSpPr>
-          <p:cNvPr id="3" name="內容版面配置區 2">
-            <a:extLst>
-              <a:ext uri="{FF2B5EF4-FFF2-40B4-BE49-F238E27FC236}">
-                <a16:creationId xmlns:a16="http://schemas.microsoft.com/office/drawing/2014/main" id="{A45F1940-58CA-5952-4FA5-9D2E7604FEB3}"/>
-              </a:ext>
-            </a:extLst>
-          </p:cNvPr>
-          <p:cNvSpPr>
-            <a:spLocks noGrp="1"/>
-          </p:cNvSpPr>
-          <p:nvPr>
-            <p:ph idx="1"/>
-          </p:nvPr>
-        </p:nvSpPr>
-        <p:spPr/>
-        <p:txBody>
-          <a:bodyPr/>
-          <a:lstStyle/>
-          <a:p>
-            <a:r>
-              <a:rPr lang="en-US" altLang="zh-Hans-HK" dirty="0"/>
-              <a:t>Brief Introduction: Build a system that allows non-technical users to query databases using plain English, with features for interactive refinement and result visualization.</a:t>
-            </a:r>
-          </a:p>
-          <a:p>
-            <a:r>
-              <a:rPr lang="en-US" altLang="zh-Hans-HK" dirty="0"/>
-              <a:t>Technical Innovation: Safety-by-construction (grammar-constrained decoding), plan-then-generate with IR visualization, retrieval-grounded schema linking, ambiguity detection with multi-turn clarification, and an execution-aware repair loop.</a:t>
-            </a:r>
-          </a:p>
-          <a:p>
-            <a:r>
-              <a:rPr lang="en-US" altLang="zh-Hans-HK" dirty="0"/>
-              <a:t>Technical Stack: Python, Transformers, SQL parsers (</a:t>
-            </a:r>
-            <a:r>
-              <a:rPr lang="en-US" altLang="zh-Hans-HK" dirty="0" err="1"/>
-              <a:t>sqlglot</a:t>
-            </a:r>
-            <a:r>
-              <a:rPr lang="en-US" altLang="zh-Hans-HK" dirty="0"/>
-              <a:t>), Vector DBs, </a:t>
-            </a:r>
-            <a:r>
-              <a:rPr lang="en-US" altLang="zh-Hans-HK" dirty="0" err="1"/>
-              <a:t>FastAPI</a:t>
-            </a:r>
-            <a:r>
-              <a:rPr lang="en-US" altLang="zh-Hans-HK" dirty="0"/>
-              <a:t>, </a:t>
-            </a:r>
-            <a:r>
-              <a:rPr lang="en-US" altLang="zh-Hans-HK" dirty="0" err="1"/>
-              <a:t>Streamlit</a:t>
-            </a:r>
-            <a:r>
-              <a:rPr lang="en-US" altLang="zh-Hans-HK" dirty="0"/>
-              <a:t>, </a:t>
-            </a:r>
-            <a:r>
-              <a:rPr lang="en-US" altLang="zh-Hans-HK" dirty="0" err="1"/>
-              <a:t>Plotly</a:t>
-            </a:r>
-            <a:r>
-              <a:rPr lang="en-US" altLang="zh-Hans-HK" dirty="0"/>
-              <a:t>/</a:t>
-            </a:r>
-            <a:r>
-              <a:rPr lang="en-US" altLang="zh-Hans-HK" dirty="0" err="1"/>
-              <a:t>ECharts</a:t>
-            </a:r>
-            <a:r>
-              <a:rPr lang="en-US" altLang="zh-Hans-HK" dirty="0"/>
-              <a:t>.</a:t>
-            </a:r>
-            <a:endParaRPr lang="zh-Hans-HK" altLang="en-US" dirty="0"/>
-          </a:p>
-        </p:txBody>
-      </p:sp>
-    </p:spTree>
-    <p:extLst>
-      <p:ext uri="{BB962C8B-B14F-4D97-AF65-F5344CB8AC3E}">
-        <p14:creationId xmlns:p14="http://schemas.microsoft.com/office/powerpoint/2010/main" val="4128965555"/>
-      </p:ext>
-    </p:extLst>
-  </p:cSld>
-  <p:clrMapOvr>
-    <a:masterClrMapping/>
-  </p:clrMapOvr>
-</p:sld>
-</file>
-
-<file path=ppt/slides/slide4.xml><?xml version="1.0" encoding="utf-8"?>
-<p:sld xmlns:a="http://schemas.openxmlformats.org/drawingml/2006/main" xmlns:r="http://schemas.openxmlformats.org/officeDocument/2006/relationships" xmlns:p="http://schemas.openxmlformats.org/presentationml/2006/main">
-  <p:cSld>
-    <p:spTree>
-      <p:nvGrpSpPr>
-        <p:cNvPr id="1" name=""/>
-        <p:cNvGrpSpPr/>
-        <p:nvPr/>
-      </p:nvGrpSpPr>
-      <p:grpSpPr>
-        <a:xfrm>
-          <a:off x="0" y="0"/>
-          <a:ext cx="0" cy="0"/>
-          <a:chOff x="0" y="0"/>
-          <a:chExt cx="0" cy="0"/>
-        </a:xfrm>
-      </p:grpSpPr>
-      <p:sp>
-        <p:nvSpPr>
-          <p:cNvPr id="2" name="標題 1">
-            <a:extLst>
-              <a:ext uri="{FF2B5EF4-FFF2-40B4-BE49-F238E27FC236}">
-                <a16:creationId xmlns:a16="http://schemas.microsoft.com/office/drawing/2014/main" id="{B00090AF-9F37-3EFA-36A2-39CACF1D510C}"/>
-              </a:ext>
-            </a:extLst>
-          </p:cNvPr>
-          <p:cNvSpPr>
-            <a:spLocks noGrp="1"/>
-          </p:cNvSpPr>
-          <p:nvPr>
-            <p:ph type="title"/>
-          </p:nvPr>
-        </p:nvSpPr>
-        <p:spPr/>
-        <p:txBody>
-          <a:bodyPr/>
-          <a:lstStyle/>
-          <a:p>
-            <a:r>
-              <a:rPr lang="en-US" altLang="zh-Hans-HK" dirty="0"/>
-              <a:t>4. Code Review Assistant with Security and Best Practices Focus</a:t>
-            </a:r>
-            <a:endParaRPr lang="zh-Hans-HK" altLang="en-US" dirty="0"/>
-          </a:p>
-        </p:txBody>
-      </p:sp>
-      <p:sp>
-        <p:nvSpPr>
-          <p:cNvPr id="3" name="內容版面配置區 2">
-            <a:extLst>
-              <a:ext uri="{FF2B5EF4-FFF2-40B4-BE49-F238E27FC236}">
-                <a16:creationId xmlns:a16="http://schemas.microsoft.com/office/drawing/2014/main" id="{AB4CAA7D-2618-4E32-2E8D-D7CA4D179EC2}"/>
-              </a:ext>
-            </a:extLst>
-          </p:cNvPr>
-          <p:cNvSpPr>
-            <a:spLocks noGrp="1"/>
-          </p:cNvSpPr>
-          <p:nvPr>
-            <p:ph idx="1"/>
-          </p:nvPr>
-        </p:nvSpPr>
-        <p:spPr/>
-        <p:txBody>
-          <a:bodyPr/>
-          <a:lstStyle/>
-          <a:p>
-            <a:r>
-              <a:rPr lang="en-US" altLang="zh-Hans-HK" dirty="0"/>
-              <a:t>Brief Introduction: Develop an intelligent code review system that identifies bugs, security vulnerabilities, and suggests improvements for code quality, performance, and maintainability.</a:t>
-            </a:r>
-          </a:p>
-          <a:p>
-            <a:r>
-              <a:rPr lang="en-US" altLang="zh-Hans-HK" dirty="0"/>
-              <a:t>Technical Innovation: Multi-aspect code analysis (security, performance, style); learning from high-quality open-source repositories; providing contextual suggestions with educational explanations.</a:t>
-            </a:r>
-          </a:p>
-          <a:p>
-            <a:r>
-              <a:rPr lang="en-US" altLang="zh-Hans-HK" dirty="0"/>
-              <a:t>Technical Stack: Python, Transformers, Static analysis tools (e.g., </a:t>
-            </a:r>
-            <a:r>
-              <a:rPr lang="en-US" altLang="zh-Hans-HK" dirty="0" err="1"/>
-              <a:t>Semgrep</a:t>
-            </a:r>
-            <a:r>
-              <a:rPr lang="en-US" altLang="zh-Hans-HK" dirty="0"/>
-              <a:t>), Git APIs, Web interface.</a:t>
-            </a:r>
-            <a:endParaRPr lang="zh-Hans-HK" altLang="en-US" dirty="0"/>
-          </a:p>
-        </p:txBody>
-      </p:sp>
-    </p:spTree>
-    <p:extLst>
-      <p:ext uri="{BB962C8B-B14F-4D97-AF65-F5344CB8AC3E}">
-        <p14:creationId xmlns:p14="http://schemas.microsoft.com/office/powerpoint/2010/main" val="1196571274"/>
-      </p:ext>
-    </p:extLst>
-  </p:cSld>
-  <p:clrMapOvr>
-    <a:masterClrMapping/>
-  </p:clrMapOvr>
-</p:sld>
-</file>
-
-<file path=ppt/slides/slide5.xml><?xml version="1.0" encoding="utf-8"?>
-<p:sld xmlns:a="http://schemas.openxmlformats.org/drawingml/2006/main" xmlns:r="http://schemas.openxmlformats.org/officeDocument/2006/relationships" xmlns:p="http://schemas.openxmlformats.org/presentationml/2006/main">
-  <p:cSld>
-    <p:spTree>
-      <p:nvGrpSpPr>
-        <p:cNvPr id="1" name=""/>
-        <p:cNvGrpSpPr/>
-        <p:nvPr/>
-      </p:nvGrpSpPr>
-      <p:grpSpPr>
-        <a:xfrm>
-          <a:off x="0" y="0"/>
-          <a:ext cx="0" cy="0"/>
-          <a:chOff x="0" y="0"/>
-          <a:chExt cx="0" cy="0"/>
-        </a:xfrm>
-      </p:grpSpPr>
-      <p:sp>
-        <p:nvSpPr>
-          <p:cNvPr id="2" name="標題 1">
-            <a:extLst>
-              <a:ext uri="{FF2B5EF4-FFF2-40B4-BE49-F238E27FC236}">
-                <a16:creationId xmlns:a16="http://schemas.microsoft.com/office/drawing/2014/main" id="{DEFF590C-2D6A-BA83-FF88-D9C516866F91}"/>
-              </a:ext>
-            </a:extLst>
-          </p:cNvPr>
-          <p:cNvSpPr>
-            <a:spLocks noGrp="1"/>
-          </p:cNvSpPr>
-          <p:nvPr>
-            <p:ph type="title"/>
-          </p:nvPr>
-        </p:nvSpPr>
-        <p:spPr/>
-        <p:txBody>
-          <a:bodyPr/>
-          <a:lstStyle/>
-          <a:p>
-            <a:r>
-              <a:rPr lang="en-US" altLang="zh-Hans-HK" dirty="0"/>
-              <a:t>5. Hallucination Detection &amp; Mitigation for LLMs</a:t>
-            </a:r>
-            <a:endParaRPr lang="zh-Hans-HK" altLang="en-US" dirty="0"/>
-          </a:p>
-        </p:txBody>
-      </p:sp>
-      <p:sp>
-        <p:nvSpPr>
-          <p:cNvPr id="3" name="內容版面配置區 2">
-            <a:extLst>
-              <a:ext uri="{FF2B5EF4-FFF2-40B4-BE49-F238E27FC236}">
-                <a16:creationId xmlns:a16="http://schemas.microsoft.com/office/drawing/2014/main" id="{C8C11CAD-F862-D8EC-F1C1-A565BC084BD2}"/>
-              </a:ext>
-            </a:extLst>
-          </p:cNvPr>
-          <p:cNvSpPr>
-            <a:spLocks noGrp="1"/>
-          </p:cNvSpPr>
-          <p:nvPr>
-            <p:ph idx="1"/>
-          </p:nvPr>
-        </p:nvSpPr>
-        <p:spPr/>
-        <p:txBody>
-          <a:bodyPr/>
-          <a:lstStyle/>
-          <a:p>
-            <a:r>
-              <a:rPr lang="en-US" altLang="zh-Hans-HK" dirty="0"/>
-              <a:t>Brief Introduction: Detect factual hallucinations in LLM outputs and reduce them using a lightweight, plug-and-play verifier module without needing a huge "judge" model.</a:t>
-            </a:r>
-          </a:p>
-          <a:p>
-            <a:r>
-              <a:rPr lang="en-US" altLang="zh-Hans-HK" dirty="0"/>
-              <a:t>Technical Innovation:  A lightweight verifier ensemble combining retrieval evidence scoring, contradiction detection (NLI), and model uncertainty signals (e.g., self-consistency, entropy).</a:t>
-            </a:r>
-          </a:p>
-          <a:p>
-            <a:r>
-              <a:rPr lang="en-US" altLang="zh-Hans-HK" dirty="0"/>
-              <a:t>Technical Stack: Python, Transformers, PEFT (</a:t>
-            </a:r>
-            <a:r>
-              <a:rPr lang="en-US" altLang="zh-Hans-HK" dirty="0" err="1"/>
-              <a:t>LoRA</a:t>
-            </a:r>
-            <a:r>
-              <a:rPr lang="en-US" altLang="zh-Hans-HK" dirty="0"/>
-              <a:t>/</a:t>
-            </a:r>
-            <a:r>
-              <a:rPr lang="en-US" altLang="zh-Hans-HK" dirty="0" err="1"/>
-              <a:t>QLoRA</a:t>
-            </a:r>
-            <a:r>
-              <a:rPr lang="en-US" altLang="zh-Hans-HK" dirty="0"/>
-              <a:t>), Vector DBs (FAISS/Chroma), NLI models (e.g., </a:t>
-            </a:r>
-            <a:r>
-              <a:rPr lang="en-US" altLang="zh-Hans-HK" dirty="0" err="1"/>
-              <a:t>DeBERTa</a:t>
-            </a:r>
-            <a:r>
-              <a:rPr lang="en-US" altLang="zh-Hans-HK" dirty="0"/>
-              <a:t>).</a:t>
-            </a:r>
-            <a:endParaRPr lang="zh-Hans-HK" altLang="en-US" dirty="0"/>
-          </a:p>
-        </p:txBody>
-      </p:sp>
-    </p:spTree>
-    <p:extLst>
-      <p:ext uri="{BB962C8B-B14F-4D97-AF65-F5344CB8AC3E}">
-        <p14:creationId xmlns:p14="http://schemas.microsoft.com/office/powerpoint/2010/main" val="3016173225"/>
-      </p:ext>
-    </p:extLst>
-  </p:cSld>
-  <p:clrMapOvr>
-    <a:masterClrMapping/>
-  </p:clrMapOvr>
-</p:sld>
-</file>
-
-<file path=ppt/slides/slide6.xml><?xml version="1.0" encoding="utf-8"?>
-<p:sld xmlns:a="http://schemas.openxmlformats.org/drawingml/2006/main" xmlns:r="http://schemas.openxmlformats.org/officeDocument/2006/relationships" xmlns:p="http://schemas.openxmlformats.org/presentationml/2006/main">
-  <p:cSld>
-    <p:spTree>
-      <p:nvGrpSpPr>
-        <p:cNvPr id="1" name=""/>
-        <p:cNvGrpSpPr/>
-        <p:nvPr/>
-      </p:nvGrpSpPr>
-      <p:grpSpPr>
-        <a:xfrm>
-          <a:off x="0" y="0"/>
-          <a:ext cx="0" cy="0"/>
-          <a:chOff x="0" y="0"/>
-          <a:chExt cx="0" cy="0"/>
-        </a:xfrm>
-      </p:grpSpPr>
-      <p:sp>
-        <p:nvSpPr>
-          <p:cNvPr id="2" name="標題 1">
-            <a:extLst>
-              <a:ext uri="{FF2B5EF4-FFF2-40B4-BE49-F238E27FC236}">
-                <a16:creationId xmlns:a16="http://schemas.microsoft.com/office/drawing/2014/main" id="{118CE7EA-A20D-5808-ADD5-103408FA9BEB}"/>
-              </a:ext>
-            </a:extLst>
-          </p:cNvPr>
-          <p:cNvSpPr>
-            <a:spLocks noGrp="1"/>
-          </p:cNvSpPr>
-          <p:nvPr>
-            <p:ph type="title"/>
-          </p:nvPr>
-        </p:nvSpPr>
-        <p:spPr/>
-        <p:txBody>
-          <a:bodyPr/>
-          <a:lstStyle/>
-          <a:p>
-            <a:r>
-              <a:rPr lang="en-US" altLang="zh-Hans-HK" dirty="0"/>
-              <a:t>General Roadmap</a:t>
-            </a:r>
-            <a:endParaRPr lang="zh-Hans-HK" altLang="en-US" dirty="0"/>
-          </a:p>
-        </p:txBody>
-      </p:sp>
-      <p:sp>
-        <p:nvSpPr>
-          <p:cNvPr id="3" name="內容版面配置區 2">
-            <a:extLst>
-              <a:ext uri="{FF2B5EF4-FFF2-40B4-BE49-F238E27FC236}">
-                <a16:creationId xmlns:a16="http://schemas.microsoft.com/office/drawing/2014/main" id="{0C0061CC-F92F-4A7C-C055-323C8E38154C}"/>
-              </a:ext>
-            </a:extLst>
-          </p:cNvPr>
-          <p:cNvSpPr>
-            <a:spLocks noGrp="1"/>
-          </p:cNvSpPr>
-          <p:nvPr>
-            <p:ph idx="1"/>
-          </p:nvPr>
-        </p:nvSpPr>
-        <p:spPr/>
-        <p:txBody>
           <a:bodyPr>
-            <a:normAutofit fontScale="85000" lnSpcReduction="10000"/>
+            <a:normAutofit fontScale="85000" lnSpcReduction="20000"/>
           </a:bodyPr>
           <a:lstStyle/>
           <a:p>
@@ -4038,6 +3559,19 @@
             <a:r>
               <a:rPr lang="en-US" altLang="zh-Hans-HK" dirty="0"/>
               <a:t>Month 6: Finalization &amp; Documentation. Refine the project based on evaluation feedback, write the final report and prepare a project presentation.</a:t>
+            </a:r>
+            <a:br>
+              <a:rPr lang="en-US" altLang="zh-Hans-HK" dirty="0"/>
+            </a:br>
+            <a:endParaRPr lang="en-US" altLang="zh-Hans-HK" dirty="0"/>
+          </a:p>
+          <a:p>
+            <a:pPr marL="0" indent="0">
+              <a:buNone/>
+            </a:pPr>
+            <a:r>
+              <a:rPr lang="en-US" altLang="zh-Hans-HK" dirty="0"/>
+              <a:t>An additional 1 month will be reserved for any unexpected event.</a:t>
             </a:r>
             <a:endParaRPr lang="zh-Hans-HK" altLang="en-US" dirty="0"/>
           </a:p>

</xml_diff>